<commit_message>
finished Status_presentation.pptx + expanded Journal_Meeting_14_04_20.md + complete Journal_Meeting_15_04_20.md
</commit_message>
<xml_diff>
--- a/Documents/Presentations/Status/Status_presentation.pptx
+++ b/Documents/Presentations/Status/Status_presentation.pptx
@@ -112,6 +112,11 @@
       </a:defRPr>
     </a:lvl9pPr>
   </p:defaultTextStyle>
+  <p:extLst>
+    <p:ext uri="{EFAFB233-063F-42B5-8137-9DF3F51BA10A}">
+      <p15:sldGuideLst xmlns:p15="http://schemas.microsoft.com/office/powerpoint/2012/main"/>
+    </p:ext>
+  </p:extLst>
 </p:presentation>
 </file>
 
@@ -13869,13 +13874,13 @@
           <a:p>
             <a:r>
               <a:rPr lang="de-DE" dirty="0"/>
-              <a:t>Konzepte geklärt</a:t>
+              <a:t>Konzept geklärt</a:t>
             </a:r>
           </a:p>
           <a:p>
             <a:r>
               <a:rPr lang="de-DE" dirty="0"/>
-              <a:t>Gerätekombinationen geklärt</a:t>
+              <a:t>Gerätekombinationen bestimmt</a:t>
             </a:r>
           </a:p>
           <a:p>

</xml_diff>

<commit_message>
appended age_of_empieres_image.jpeg to Status_presentation.pptx
</commit_message>
<xml_diff>
--- a/Documents/Presentations/Status/Status_presentation.pptx
+++ b/Documents/Presentations/Status/Status_presentation.pptx
@@ -13354,10 +13354,10 @@
       </p:grpSpPr>
       <p:grpSp>
         <p:nvGrpSpPr>
-          <p:cNvPr id="10" name="Group 9">
+          <p:cNvPr id="25" name="Group 24">
             <a:extLst>
               <a:ext uri="{FF2B5EF4-FFF2-40B4-BE49-F238E27FC236}">
-                <a16:creationId xmlns:a16="http://schemas.microsoft.com/office/drawing/2014/main" id="{4CD981C6-3EC5-4C3F-97F0-FE195DDA341D}"/>
+                <a16:creationId xmlns:a16="http://schemas.microsoft.com/office/drawing/2014/main" id="{1488DB6F-238F-4BEF-B28F-87D9F674A343}"/>
               </a:ext>
               <a:ext uri="{C183D7F6-B498-43B3-948B-1728B52AA6E4}">
                 <adec:decorative xmlns:adec="http://schemas.microsoft.com/office/drawing/2017/decorative" val="1"/>
@@ -13385,10 +13385,10 @@
         </p:grpSpPr>
         <p:sp useBgFill="1">
           <p:nvSpPr>
-            <p:cNvPr id="11" name="Rectangle 10">
+            <p:cNvPr id="26" name="Rectangle 25">
               <a:extLst>
                 <a:ext uri="{FF2B5EF4-FFF2-40B4-BE49-F238E27FC236}">
-                  <a16:creationId xmlns:a16="http://schemas.microsoft.com/office/drawing/2014/main" id="{093D8CF8-345C-4770-ACE7-5B99224924B6}"/>
+                  <a16:creationId xmlns:a16="http://schemas.microsoft.com/office/drawing/2014/main" id="{DD071421-D153-4C0F-A43D-77AF883B3458}"/>
                 </a:ext>
                 <a:ext uri="{C183D7F6-B498-43B3-948B-1728B52AA6E4}">
                   <adec:decorative xmlns:adec="http://schemas.microsoft.com/office/drawing/2017/decorative" val="1"/>
@@ -13443,10 +13443,10 @@
         </p:sp>
         <p:grpSp>
           <p:nvGrpSpPr>
-            <p:cNvPr id="12" name="Group 11">
+            <p:cNvPr id="27" name="Group 26">
               <a:extLst>
                 <a:ext uri="{FF2B5EF4-FFF2-40B4-BE49-F238E27FC236}">
-                  <a16:creationId xmlns:a16="http://schemas.microsoft.com/office/drawing/2014/main" id="{71AADDD6-E336-430F-A143-E1449FFBDEAA}"/>
+                  <a16:creationId xmlns:a16="http://schemas.microsoft.com/office/drawing/2014/main" id="{E871F7D8-217E-4113-83FA-FFAC54BE7F02}"/>
                 </a:ext>
                 <a:ext uri="{C183D7F6-B498-43B3-948B-1728B52AA6E4}">
                   <adec:decorative xmlns:adec="http://schemas.microsoft.com/office/drawing/2017/decorative" val="1"/>
@@ -13472,10 +13472,10 @@
           </p:grpSpPr>
           <p:pic>
             <p:nvPicPr>
-              <p:cNvPr id="13" name="Picture 12">
+              <p:cNvPr id="28" name="Picture 27">
                 <a:extLst>
                   <a:ext uri="{FF2B5EF4-FFF2-40B4-BE49-F238E27FC236}">
-                    <a16:creationId xmlns:a16="http://schemas.microsoft.com/office/drawing/2014/main" id="{D3D05261-D481-47F2-AC96-E7DCF933D216}"/>
+                    <a16:creationId xmlns:a16="http://schemas.microsoft.com/office/drawing/2014/main" id="{AE6B31E5-D515-487D-98AE-A3251F2F1670}"/>
                   </a:ext>
                   <a:ext uri="{C183D7F6-B498-43B3-948B-1728B52AA6E4}">
                     <adec:decorative xmlns:adec="http://schemas.microsoft.com/office/drawing/2017/decorative" val="1"/>
@@ -13517,10 +13517,10 @@
           </p:pic>
           <p:sp>
             <p:nvSpPr>
-              <p:cNvPr id="14" name="Rectangle 13">
+              <p:cNvPr id="29" name="Rectangle 28">
                 <a:extLst>
                   <a:ext uri="{FF2B5EF4-FFF2-40B4-BE49-F238E27FC236}">
-                    <a16:creationId xmlns:a16="http://schemas.microsoft.com/office/drawing/2014/main" id="{A64A2D2E-27E9-4C54-AD41-D18C3AE9050D}"/>
+                    <a16:creationId xmlns:a16="http://schemas.microsoft.com/office/drawing/2014/main" id="{8DFB339C-7306-4C4B-A75F-5BEE240BA260}"/>
                   </a:ext>
                   <a:ext uri="{C183D7F6-B498-43B3-948B-1728B52AA6E4}">
                     <adec:decorative xmlns:adec="http://schemas.microsoft.com/office/drawing/2017/decorative" val="1"/>
@@ -13566,10 +13566,10 @@
           </p:sp>
           <p:pic>
             <p:nvPicPr>
-              <p:cNvPr id="15" name="Picture 14">
+              <p:cNvPr id="30" name="Picture 29">
                 <a:extLst>
                   <a:ext uri="{FF2B5EF4-FFF2-40B4-BE49-F238E27FC236}">
-                    <a16:creationId xmlns:a16="http://schemas.microsoft.com/office/drawing/2014/main" id="{73335F48-A05B-443B-AB98-E17241148CE3}"/>
+                    <a16:creationId xmlns:a16="http://schemas.microsoft.com/office/drawing/2014/main" id="{A1202C9E-12FB-4368-AD4E-40992C251446}"/>
                   </a:ext>
                   <a:ext uri="{C183D7F6-B498-43B3-948B-1728B52AA6E4}">
                     <adec:decorative xmlns:adec="http://schemas.microsoft.com/office/drawing/2017/decorative" val="1"/>
@@ -13610,10 +13610,10 @@
           </p:pic>
           <p:pic>
             <p:nvPicPr>
-              <p:cNvPr id="16" name="Picture 15">
+              <p:cNvPr id="31" name="Picture 30">
                 <a:extLst>
                   <a:ext uri="{FF2B5EF4-FFF2-40B4-BE49-F238E27FC236}">
-                    <a16:creationId xmlns:a16="http://schemas.microsoft.com/office/drawing/2014/main" id="{4B1A363B-5FCE-4BA3-86EA-4A95DF5B3F1D}"/>
+                    <a16:creationId xmlns:a16="http://schemas.microsoft.com/office/drawing/2014/main" id="{F3E08DAB-0254-426B-80D4-79EF92845E87}"/>
                   </a:ext>
                   <a:ext uri="{C183D7F6-B498-43B3-948B-1728B52AA6E4}">
                     <adec:decorative xmlns:adec="http://schemas.microsoft.com/office/drawing/2017/decorative" val="1"/>
@@ -13683,18 +13683,19 @@
           <a:lstStyle/>
           <a:p>
             <a:r>
-              <a:rPr lang="de-DE" dirty="0"/>
+              <a:rPr lang="de-DE"/>
               <a:t>Aktueller Stand</a:t>
             </a:r>
+            <a:endParaRPr lang="de-DE" dirty="0"/>
           </a:p>
         </p:txBody>
       </p:sp>
       <p:sp>
         <p:nvSpPr>
-          <p:cNvPr id="18" name="Rectangle 17">
+          <p:cNvPr id="33" name="Rectangle 32">
             <a:extLst>
               <a:ext uri="{FF2B5EF4-FFF2-40B4-BE49-F238E27FC236}">
-                <a16:creationId xmlns:a16="http://schemas.microsoft.com/office/drawing/2014/main" id="{56202298-0030-4CC3-9BE1-94DE4227FA5F}"/>
+                <a16:creationId xmlns:a16="http://schemas.microsoft.com/office/drawing/2014/main" id="{9B796F99-70AC-4221-AB20-DFE9599613B9}"/>
               </a:ext>
               <a:ext uri="{C183D7F6-B498-43B3-948B-1728B52AA6E4}">
                 <adec:decorative xmlns:adec="http://schemas.microsoft.com/office/drawing/2017/decorative" val="1"/>
@@ -13760,10 +13761,10 @@
       </p:sp>
       <p:pic>
         <p:nvPicPr>
-          <p:cNvPr id="7" name="Graphic 6">
+          <p:cNvPr id="5" name="Grafik 4" descr="Ein Bild, das Gras enthält.&#10;&#10;Automatisch generierte Beschreibung">
             <a:extLst>
               <a:ext uri="{FF2B5EF4-FFF2-40B4-BE49-F238E27FC236}">
-                <a16:creationId xmlns:a16="http://schemas.microsoft.com/office/drawing/2014/main" id="{E5C1C805-6D03-4B52-BDAE-7DD38E38A9B8}"/>
+                <a16:creationId xmlns:a16="http://schemas.microsoft.com/office/drawing/2014/main" id="{5BCAB72A-C8B5-480B-B9C2-E7965B7F1BDC}"/>
               </a:ext>
             </a:extLst>
           </p:cNvPr>
@@ -13772,25 +13773,21 @@
           </p:cNvPicPr>
           <p:nvPr/>
         </p:nvPicPr>
-        <p:blipFill>
+        <p:blipFill rotWithShape="1">
           <a:blip r:embed="rId5">
             <a:extLst>
               <a:ext uri="{28A0092B-C50C-407E-A947-70E740481C1C}">
                 <a14:useLocalDpi xmlns:a14="http://schemas.microsoft.com/office/drawing/2010/main" val="0"/>
               </a:ext>
-              <a:ext uri="{96DAC541-7B7A-43D3-8B79-37D633B846F1}">
-                <asvg:svgBlip xmlns:asvg="http://schemas.microsoft.com/office/drawing/2016/SVG/main" r:embed="rId6"/>
-              </a:ext>
             </a:extLst>
           </a:blip>
-          <a:stretch>
-            <a:fillRect/>
-          </a:stretch>
+          <a:srcRect l="7193" r="33533" b="1"/>
+          <a:stretch/>
         </p:blipFill>
         <p:spPr>
           <a:xfrm>
-            <a:off x="1421693" y="1410208"/>
-            <a:ext cx="3858780" cy="3858780"/>
+            <a:off x="1412746" y="1420362"/>
+            <a:ext cx="3876801" cy="3858780"/>
           </a:xfrm>
           <a:prstGeom prst="rect">
             <a:avLst/>
@@ -13799,10 +13796,10 @@
       </p:pic>
       <p:cxnSp>
         <p:nvCxnSpPr>
-          <p:cNvPr id="20" name="Straight Connector 19">
+          <p:cNvPr id="40" name="Straight Connector 34">
             <a:extLst>
               <a:ext uri="{FF2B5EF4-FFF2-40B4-BE49-F238E27FC236}">
-                <a16:creationId xmlns:a16="http://schemas.microsoft.com/office/drawing/2014/main" id="{23E9AB96-F9B3-463D-BA23-961C1B0E6F8A}"/>
+                <a16:creationId xmlns:a16="http://schemas.microsoft.com/office/drawing/2014/main" id="{3017F138-68A9-4F3F-B240-D26602C26CB7}"/>
               </a:ext>
               <a:ext uri="{C183D7F6-B498-43B3-948B-1728B52AA6E4}">
                 <adec:decorative xmlns:adec="http://schemas.microsoft.com/office/drawing/2017/decorative" val="1"/>
@@ -13873,25 +13870,25 @@
           <a:lstStyle/>
           <a:p>
             <a:r>
-              <a:rPr lang="de-DE" dirty="0"/>
+              <a:rPr lang="de-DE"/>
               <a:t>Konzept geklärt</a:t>
             </a:r>
           </a:p>
           <a:p>
             <a:r>
-              <a:rPr lang="de-DE" dirty="0"/>
+              <a:rPr lang="de-DE"/>
               <a:t>Gerätekombinationen bestimmt</a:t>
             </a:r>
           </a:p>
           <a:p>
             <a:r>
-              <a:rPr lang="de-DE" dirty="0"/>
+              <a:rPr lang="de-DE"/>
               <a:t>Einigung auf hauptsächlich Python </a:t>
             </a:r>
           </a:p>
           <a:p>
             <a:r>
-              <a:rPr lang="de-DE" dirty="0"/>
+              <a:rPr lang="de-DE"/>
               <a:t>Rahmenbedingungen für Zusammenarbeit mit anderen Gruppen</a:t>
             </a:r>
           </a:p>

</xml_diff>